<commit_message>
Update slides for LSNVMM
</commit_message>
<xml_diff>
--- a/files/lsnvmm_slides_atc17.pptx
+++ b/files/lsnvmm_slides_atc17.pptx
@@ -226,7 +226,7 @@
           <a:p>
             <a:fld id="{C4548EE3-861C-4158-AA64-E9BC4289E81A}" type="datetimeFigureOut">
               <a:rPr lang="en-US" smtClean="0"/>
-              <a:t>7/16/2017</a:t>
+              <a:t>12/6/2017</a:t>
             </a:fld>
             <a:endParaRPr lang="en-US"/>
           </a:p>
@@ -537,34 +537,11 @@
           <a:bodyPr/>
           <a:lstStyle/>
           <a:p>
-            <a:pPr marL="171450" indent="-171450">
+            <a:pPr marL="0" indent="0">
               <a:buFont typeface="Arial" panose="020B0604020202020204" pitchFamily="34" charset="0"/>
-              <a:buChar char="•"/>
+              <a:buNone/>
             </a:pPr>
-            <a:r>
-              <a:rPr lang="en-US" dirty="0"/>
-              <a:t>Today I’ll talk about our work on non-volatile memory. It is joint work with Qingda, Anirudh and Thomas.</a:t>
-            </a:r>
-          </a:p>
-          <a:p>
-            <a:pPr marL="171450" indent="-171450">
-              <a:buFont typeface="Arial" panose="020B0604020202020204" pitchFamily="34" charset="0"/>
-              <a:buChar char="•"/>
-            </a:pPr>
-            <a:r>
-              <a:rPr lang="en-US" dirty="0"/>
-              <a:t>Briefly, we designed log-structured memory management for non-volatile main memory, so you can see many logs in the picture.</a:t>
-            </a:r>
-          </a:p>
-          <a:p>
-            <a:pPr marL="171450" indent="-171450">
-              <a:buFont typeface="Arial" panose="020B0604020202020204" pitchFamily="34" charset="0"/>
-              <a:buChar char="•"/>
-            </a:pPr>
-            <a:r>
-              <a:rPr lang="en-US" dirty="0"/>
-              <a:t>Before introducing the logs, let's get to know non-volatile memory, or NVM.</a:t>
-            </a:r>
+            <a:endParaRPr lang="en-US" dirty="0"/>
           </a:p>
         </p:txBody>
       </p:sp>
@@ -654,7 +631,7 @@
             </a:pPr>
             <a:r>
               <a:rPr lang="en-US" dirty="0"/>
-              <a:t>Let me first introduce the core design, and then explain why the design solves the problems. The log-structured NVMM is a user-space library by which applications can allocate or free NVM space and access NVM data through transactions.</a:t>
+              <a:t>The log-structured NVMM is a user-space library by which applications can allocate or free NVM space and access NVM data through transactions.</a:t>
             </a:r>
           </a:p>
           <a:p>
@@ -694,7 +671,7 @@
             </a:pPr>
             <a:r>
               <a:rPr lang="en-US" dirty="0"/>
-              <a:t>Then, a question is: how can the application find the new location of a variable? That requires an address translation mechanism. It translates an address in application view to the real address in the log. So, every NVM access has to call an address translate function. Internally, our library maintains an address mapping structure to perform the translation. In our system, we put address mappings in DRAM for better performance. If the address mappings are lost due to a crash, they can be rebuilt from the log. So, access or update to address mappings does not involve NVM. That's favorable to performance.</a:t>
+              <a:t>An address translation mechanism translates an address in application view to the real address in the log. So, every NVM access has to call an address translate function. Internally, our library maintains an address mapping structure to perform the translation. In our system, we put address mappings in DRAM for better performance. If the address mappings are lost due to a crash, they can be rebuilt from the log. So, access or update to address mappings does not involve NVM.</a:t>
             </a:r>
           </a:p>
         </p:txBody>
@@ -785,16 +762,6 @@
             </a:pPr>
             <a:r>
               <a:rPr lang="en-US" dirty="0"/>
-              <a:t>Next, let's see how this log-structured approach solves the two motivative problems.</a:t>
-            </a:r>
-          </a:p>
-          <a:p>
-            <a:pPr marL="171450" indent="-171450">
-              <a:buFont typeface="Arial" panose="020B0604020202020204" pitchFamily="34" charset="0"/>
-              <a:buChar char="•"/>
-            </a:pPr>
-            <a:r>
-              <a:rPr lang="en-US" dirty="0"/>
               <a:t>For memory fragmentation, we completely avoid internal fragmentation because all data is compactly appended to the log. There is just no fragment between them.</a:t>
             </a:r>
           </a:p>
@@ -926,7 +893,7 @@
             </a:pPr>
             <a:r>
               <a:rPr lang="en-US" dirty="0"/>
-              <a:t>Take this transaction for example. Initially, A and B are mapped to some addresses in the log. To update them, we append their new values to the log along with some metadata. The metadata includes a checksum of the new values. Suppose a crash interrupts the transaction. We can verify the checksum on recovery. If it is invalid, we simply truncate the log and discard new values. In this way, we write A and B only once but still guarantees crash consistency. In most cases, we can save a significant amount of write traffic, leading to high throughput and low wear-out. In summary, the log-structured approach solves the two problems. But applying it to the main memory is not as easy as it sounds.</a:t>
+              <a:t>Take the transaction for example. Initially, A and B are mapped to some addresses in the log. To update them, we append their new values to the log along with some metadata. The metadata includes a checksum of the new values. Suppose a crash interrupts the transaction. We can verify the checksum on recovery. If it is invalid, we simply truncate the log and discard new values. In this way, we write A and B only once but still guarantees crash consistency. In most cases, we can save a significant amount of write traffic, leading to high throughput and low wear-out. In summary, the log-structured approach solves the two problems. But applying it to the main memory is not as easy as it sounds.</a:t>
             </a:r>
           </a:p>
         </p:txBody>
@@ -1011,14 +978,11 @@
           <a:bodyPr/>
           <a:lstStyle/>
           <a:p>
-            <a:pPr marL="171450" indent="-171450">
+            <a:pPr marL="0" indent="0">
               <a:buFont typeface="Arial" panose="020B0604020202020204" pitchFamily="34" charset="0"/>
-              <a:buChar char="•"/>
+              <a:buNone/>
             </a:pPr>
-            <a:r>
-              <a:rPr lang="en-US" dirty="0"/>
-              <a:t>Next, I’ll introduce challenges and a key technical contribution of our work.</a:t>
-            </a:r>
+            <a:endParaRPr lang="en-US" dirty="0"/>
           </a:p>
         </p:txBody>
       </p:sp>
@@ -1144,7 +1108,7 @@
             </a:pPr>
             <a:r>
               <a:rPr lang="en-US" dirty="0"/>
-              <a:t>Second, in main memory, the allocation granularity is not equivalent to the access granularity. That means we cannot directly use O(1) data structures like hash table to do the address mapping.</a:t>
+              <a:t>Second, in main memory, the allocation granularity is not equivalent to the access granularity. That means we cannot directly use O(1) data structures like hash table to do the address mapping. In main memory, an application can allocate an area at some address, but access any arbitrary address in that area. So, which address should we use to index that area? Definitely, we cannot map every memory address.</a:t>
             </a:r>
           </a:p>
           <a:p>
@@ -1154,7 +1118,7 @@
             </a:pPr>
             <a:r>
               <a:rPr lang="en-US" dirty="0"/>
-              <a:t>To understand this, let's first see filesystems and databases who have the same allocation and access granularity. In a filesystem, data is both allocated and accessed in blocks. So, we can use the block number to index the data. Particularly, we can use a hash table to map block number to disk address in O(1). Similarly in a database, either a key-value pair or a tuple is the allocation and access granularity. Data can be mapped by the key or tuple ID. It is also good.</a:t>
+              <a:t>Therefore, the only viable way to map memory addresses is to use a tree data structure. In such a tree, each node holds the starting address and the size of an allocated area. We only need to index the staring address of an allocated area. Different from hash table, a tree maintains the order of indexed addresses. So we can find nearby addresses. For example, an application allocates a 24B area at the address 0xABC0. If the application queries the address 0xABC8, we can go down the tree and find the node 0xABC0 that contains the target address. So, a tree enables using the allocation granularity to serve arbitrary access.</a:t>
             </a:r>
           </a:p>
           <a:p>
@@ -1164,17 +1128,7 @@
             </a:pPr>
             <a:r>
               <a:rPr lang="en-US" dirty="0"/>
-              <a:t>But, in main memory, it is more complicated. An application can allocate an area at some address, but access any arbitrary address in that area. So, which address should we use to index that area? Definitely, we cannot map every memory address.</a:t>
-            </a:r>
-          </a:p>
-          <a:p>
-            <a:pPr marL="171450" indent="-171450">
-              <a:buFont typeface="Arial" panose="020B0604020202020204" pitchFamily="34" charset="0"/>
-              <a:buChar char="•"/>
-            </a:pPr>
-            <a:r>
-              <a:rPr lang="en-US" dirty="0"/>
-              <a:t>Therefore, the only viable way to map memory addresses is to use a tree data structure. In such a tree, each node holds the starting address and the size of an allocated area. We only need to index the staring address of an allocated area. Different from hash table, a tree maintains the order of indexed addresses. So we can find nearby addresses. For example, an application allocates a 24B area at the address 0xABC0. If the application queries the address 0xABC8, we can go down the tree and find the node 0xABC0 that contains the target address. So, a tree enables using the allocation granularity to serve arbitrary access. In summary, we need a tree structure for address mapping and the tree has to be very performant.</a:t>
+              <a:t>In summary, we need a tree structure for address mapping and the tree has to be very performant.</a:t>
             </a:r>
           </a:p>
         </p:txBody>
@@ -1396,7 +1350,7 @@
             </a:pPr>
             <a:r>
               <a:rPr lang="en-US" dirty="0"/>
-              <a:t>In contrast, the skip list is a probabilistic tree structure without balancing operations. A skip list consists of several singly linked lists of nodes to form a tree structure. I don't go to details here but what we can achieve is lock-free lookup operations. Of course, you could choose other lock-free trees.</a:t>
+              <a:t>In contrast, the skip list is a probabilistic tree structure without balancing operations. A skip list consists of several singly linked lists of nodes to form a tree structure. I don't go to details here but what we can achieve is lock-free lookup operations.</a:t>
             </a:r>
           </a:p>
           <a:p>
@@ -1405,12 +1359,8 @@
               <a:buChar char="•"/>
             </a:pPr>
             <a:r>
-              <a:rPr lang="en-US"/>
-              <a:t>Anyway, our </a:t>
-            </a:r>
-            <a:r>
               <a:rPr lang="en-US" dirty="0"/>
-              <a:t>observation is that avoiding lock for very frequent lookup operations improves the transaction throughput by almost 50% with four threads.</a:t>
+              <a:t>Our observation is that avoiding lock for very frequent lookup operations improves the transaction throughput by almost 50% with four threads.</a:t>
             </a:r>
           </a:p>
         </p:txBody>
@@ -1495,14 +1445,11 @@
           <a:bodyPr/>
           <a:lstStyle/>
           <a:p>
-            <a:pPr marL="171450" indent="-171450">
+            <a:pPr marL="0" indent="0">
               <a:buFont typeface="Arial" panose="020B0604020202020204" pitchFamily="34" charset="0"/>
-              <a:buChar char="•"/>
+              <a:buNone/>
             </a:pPr>
-            <a:r>
-              <a:rPr lang="en-US" dirty="0"/>
-              <a:t>The third optimization is group update. When running a transaction, all writes are first buffered in DRAM, and sorted before transaction commit. Then contiguous writes are combined in order to reduce the number of tree node updates. This technique improves transaction throughput by over 42% on average.</a:t>
-            </a:r>
+            <a:endParaRPr lang="en-US" dirty="0"/>
           </a:p>
         </p:txBody>
       </p:sp>
@@ -1612,17 +1559,7 @@
             </a:pPr>
             <a:r>
               <a:rPr lang="en-US" dirty="0"/>
-              <a:t>So, we came up with a simple solution: use high-order bits of an address as its hash value. Nearby addresses of a cached address tend to be a collision and encounter the cached node.</a:t>
-            </a:r>
-          </a:p>
-          <a:p>
-            <a:pPr marL="171450" indent="-171450">
-              <a:buFont typeface="Arial" panose="020B0604020202020204" pitchFamily="34" charset="0"/>
-              <a:buChar char="•"/>
-            </a:pPr>
-            <a:r>
-              <a:rPr lang="en-US" dirty="0"/>
-              <a:t>Overall, the tree node cache improves transaction throughput by over 30% on average.</a:t>
+              <a:t>So, we came up with a simple solution: use high-order bits of an address as its hash value. Nearby addresses of a cached address tend to be a collision and encounter the cached node. Overall, the tree node cache improves transaction throughput by over 30% on average.</a:t>
             </a:r>
           </a:p>
         </p:txBody>
@@ -1707,10 +1644,7 @@
           <a:bodyPr/>
           <a:lstStyle/>
           <a:p>
-            <a:r>
-              <a:rPr lang="en-US" dirty="0"/>
-              <a:t>The last part of the talk is a quick view of the evaluation results. </a:t>
-            </a:r>
+            <a:endParaRPr lang="en-US" dirty="0"/>
           </a:p>
         </p:txBody>
       </p:sp>
@@ -1794,34 +1728,11 @@
           <a:bodyPr/>
           <a:lstStyle/>
           <a:p>
-            <a:pPr marL="171450" indent="-171450">
+            <a:pPr marL="0" indent="0">
               <a:buFont typeface="Arial" panose="020B0604020202020204" pitchFamily="34" charset="0"/>
-              <a:buChar char="•"/>
+              <a:buNone/>
             </a:pPr>
-            <a:r>
-              <a:rPr lang="en-US" dirty="0"/>
-              <a:t>NVM is a new revolutionary storage media that can hold persistent data, just like disks. At the same time, it supports byte-addressable access at DRAM-level performance. </a:t>
-            </a:r>
-          </a:p>
-          <a:p>
-            <a:pPr marL="171450" indent="-171450">
-              <a:buFont typeface="Arial" panose="020B0604020202020204" pitchFamily="34" charset="0"/>
-              <a:buChar char="•"/>
-            </a:pPr>
-            <a:r>
-              <a:rPr lang="en-US" dirty="0"/>
-              <a:t>Take phase change memory (PCM) for example. Its read performance is similar to DRAM, and its write performance is one or two orders of magnitude better than SSDs.</a:t>
-            </a:r>
-          </a:p>
-          <a:p>
-            <a:pPr marL="171450" indent="-171450">
-              <a:buFont typeface="Arial" panose="020B0604020202020204" pitchFamily="34" charset="0"/>
-              <a:buChar char="•"/>
-            </a:pPr>
-            <a:r>
-              <a:rPr lang="en-US" dirty="0"/>
-              <a:t>More importantly, NVM is approaching our life. Intel and Micron have announced products 3D XPoint and Optane.</a:t>
-            </a:r>
+            <a:endParaRPr lang="en-US" dirty="0"/>
           </a:p>
         </p:txBody>
       </p:sp>
@@ -1905,24 +1816,11 @@
           <a:bodyPr/>
           <a:lstStyle/>
           <a:p>
-            <a:pPr marL="171450" indent="-171450">
+            <a:pPr marL="0" indent="0">
               <a:buFont typeface="Arial" panose="020B0604020202020204" pitchFamily="34" charset="0"/>
-              <a:buChar char="•"/>
+              <a:buNone/>
             </a:pPr>
-            <a:r>
-              <a:rPr lang="en-US" dirty="0"/>
-              <a:t>Our experiments are run on a regular server. The NVM is emulated by adding write latency to DRAM writes.</a:t>
-            </a:r>
-          </a:p>
-          <a:p>
-            <a:pPr marL="171450" indent="-171450">
-              <a:buFont typeface="Arial" panose="020B0604020202020204" pitchFamily="34" charset="0"/>
-              <a:buChar char="•"/>
-            </a:pPr>
-            <a:r>
-              <a:rPr lang="en-US" dirty="0"/>
-              <a:t>In previous slides, I already show how effective each optimization is. So, here we focus on how LSNVMM compare to other systems and what are inherent costs of the log-structured approach.</a:t>
-            </a:r>
+            <a:endParaRPr lang="en-US" dirty="0"/>
           </a:p>
         </p:txBody>
       </p:sp>
@@ -2006,34 +1904,7 @@
           <a:bodyPr/>
           <a:lstStyle/>
           <a:p>
-            <a:r>
-              <a:rPr lang="en-US" dirty="0"/>
-              <a:t>This slide shows fragment reduction. Hoard and </a:t>
-            </a:r>
-            <a:r>
-              <a:rPr lang="en-US" dirty="0" err="1"/>
-              <a:t>jemalloc</a:t>
-            </a:r>
-            <a:r>
-              <a:rPr lang="en-US" dirty="0"/>
-              <a:t> are two typical and widely used DRAM allocators. In various workloads collected from this </a:t>
-            </a:r>
-            <a:r>
-              <a:rPr lang="en-US" dirty="0" err="1"/>
-              <a:t>RAMCloud</a:t>
-            </a:r>
-            <a:r>
-              <a:rPr lang="en-US" dirty="0"/>
-              <a:t> paper, Hoard and </a:t>
-            </a:r>
-            <a:r>
-              <a:rPr lang="en-US" dirty="0" err="1"/>
-              <a:t>jemalloc</a:t>
-            </a:r>
-            <a:r>
-              <a:rPr lang="en-US" dirty="0"/>
-              <a:t> incurs 25% and 35% waste of memory on average, respectively. In contrast, NVM only produces 4.5% waste which is mainly due to the metadata we write in the log.</a:t>
-            </a:r>
+            <a:endParaRPr lang="en-US" dirty="0"/>
           </a:p>
         </p:txBody>
       </p:sp>
@@ -2117,10 +1988,7 @@
           <a:bodyPr/>
           <a:lstStyle/>
           <a:p>
-            <a:r>
-              <a:rPr lang="en-US" dirty="0"/>
-              <a:t>In terms of transaction throughput, we compare LSNVMM to Mnemosyne and Mnemosyne-Undo. Mnemosyne is a state-of-the-art persistent memory system that uses redo logging. Mnemosyne-Undo is a variant of Mnemosyne using undo logging. We test them with various data structures. LSNVMM outperforms Mnemosyne and Mnemosyne-Undo by 45% and 80% on average, respectively. </a:t>
-            </a:r>
+            <a:endParaRPr lang="en-US" dirty="0"/>
           </a:p>
         </p:txBody>
       </p:sp>
@@ -2204,10 +2072,7 @@
           <a:bodyPr/>
           <a:lstStyle/>
           <a:p>
-            <a:r>
-              <a:rPr lang="en-US" dirty="0"/>
-              <a:t>Next we show the cost of log cleaning. In the figure, the x axis is the memory utilization. The left y axis is the transaction throughput, and the right y axis is the cleaning throughput. We run this experiment with a key-value store by inserting 128B values to the store. We can see that the performance degradation due to cleaning is only 8% even at 90% memory utilization.</a:t>
-            </a:r>
+            <a:endParaRPr lang="en-US" dirty="0"/>
           </a:p>
         </p:txBody>
       </p:sp>
@@ -2291,10 +2156,7 @@
           <a:bodyPr/>
           <a:lstStyle/>
           <a:p>
-            <a:r>
-              <a:rPr lang="en-US" dirty="0"/>
-              <a:t>In conclusion, I summarize two insights you may take away from this talk.</a:t>
-            </a:r>
+            <a:endParaRPr lang="en-US" dirty="0"/>
           </a:p>
         </p:txBody>
       </p:sp>
@@ -2546,34 +2408,11 @@
           <a:bodyPr/>
           <a:lstStyle/>
           <a:p>
-            <a:pPr marL="171450" indent="-171450">
+            <a:pPr marL="0" indent="0">
               <a:buFont typeface="Arial" panose="020B0604020202020204" pitchFamily="34" charset="0"/>
-              <a:buChar char="•"/>
+              <a:buNone/>
             </a:pPr>
-            <a:r>
-              <a:rPr lang="en-US" dirty="0"/>
-              <a:t>So, what is the impact of NVM to the current software systems? Traditionally, data persistence easily becomes a bottleneck because we have to constantly move data from DRAM to SSD and the other way around.</a:t>
-            </a:r>
-          </a:p>
-          <a:p>
-            <a:pPr marL="171450" indent="-171450">
-              <a:buFont typeface="Arial" panose="020B0604020202020204" pitchFamily="34" charset="0"/>
-              <a:buChar char="•"/>
-            </a:pPr>
-            <a:r>
-              <a:rPr lang="en-US" dirty="0"/>
-              <a:t>In the near future, we can set up NVM as part of the main memory, so that applications can directly access persistent data through CPU instructions. Therefore, the traditional bottleneck is avoided. We refer to this architecture as non-volatile main memory (NVMM).</a:t>
-            </a:r>
-          </a:p>
-          <a:p>
-            <a:pPr marL="171450" indent="-171450">
-              <a:buFont typeface="Arial" panose="020B0604020202020204" pitchFamily="34" charset="0"/>
-              <a:buChar char="•"/>
-            </a:pPr>
-            <a:r>
-              <a:rPr lang="en-US" dirty="0"/>
-              <a:t>It can boost application performance by more than 10 times, according to many prior experiments.</a:t>
-            </a:r>
+            <a:endParaRPr lang="en-US" dirty="0"/>
           </a:p>
         </p:txBody>
       </p:sp>
@@ -2657,54 +2496,11 @@
           <a:bodyPr/>
           <a:lstStyle/>
           <a:p>
-            <a:pPr marL="171450" indent="-171450">
+            <a:pPr marL="0" indent="0">
               <a:buFont typeface="Arial" panose="020B0604020202020204" pitchFamily="34" charset="0"/>
-              <a:buChar char="•"/>
+              <a:buNone/>
             </a:pPr>
-            <a:r>
-              <a:rPr lang="en-US" dirty="0"/>
-              <a:t>Now, let me give you a one-slide overview of our work. </a:t>
-            </a:r>
-          </a:p>
-          <a:p>
-            <a:pPr marL="171450" indent="-171450">
-              <a:buFont typeface="Arial" panose="020B0604020202020204" pitchFamily="34" charset="0"/>
-              <a:buChar char="•"/>
-            </a:pPr>
-            <a:r>
-              <a:rPr lang="en-US" dirty="0"/>
-              <a:t>To develop software systems on NVM, we find two major problems. </a:t>
-            </a:r>
-          </a:p>
-          <a:p>
-            <a:pPr marL="171450" indent="-171450">
-              <a:buFont typeface="Arial" panose="020B0604020202020204" pitchFamily="34" charset="0"/>
-              <a:buChar char="•"/>
-            </a:pPr>
-            <a:r>
-              <a:rPr lang="en-US" dirty="0"/>
-              <a:t>One is inefficient use of memory space. There is a lot of waste of memory space. The other is inefficient support for crash consistency, leading to low write throughput -- I will explain them latter.</a:t>
-            </a:r>
-          </a:p>
-          <a:p>
-            <a:pPr marL="171450" indent="-171450">
-              <a:buFont typeface="Arial" panose="020B0604020202020204" pitchFamily="34" charset="0"/>
-              <a:buChar char="•"/>
-            </a:pPr>
-            <a:r>
-              <a:rPr lang="en-US" dirty="0"/>
-              <a:t>To solve these problems, we designed a log-structured memory management library for non-volatile main memory.</a:t>
-            </a:r>
-          </a:p>
-          <a:p>
-            <a:pPr marL="171450" indent="-171450">
-              <a:buFont typeface="Arial" panose="020B0604020202020204" pitchFamily="34" charset="0"/>
-              <a:buChar char="•"/>
-            </a:pPr>
-            <a:r>
-              <a:rPr lang="en-US" dirty="0"/>
-              <a:t>Our evaluation shows that this log-structured way can reduce memory waste by almost 7 times and improve write throughput by almost 90%.</a:t>
-            </a:r>
+            <a:endParaRPr lang="en-US" dirty="0"/>
           </a:p>
         </p:txBody>
       </p:sp>
@@ -2788,10 +2584,7 @@
           <a:bodyPr/>
           <a:lstStyle/>
           <a:p>
-            <a:r>
-              <a:rPr lang="en-US" dirty="0"/>
-              <a:t>Next, I will detail our work in four parts. Let's start with motivation.</a:t>
-            </a:r>
+            <a:endParaRPr lang="en-US" dirty="0"/>
           </a:p>
         </p:txBody>
       </p:sp>
@@ -2875,44 +2668,11 @@
           <a:bodyPr/>
           <a:lstStyle/>
           <a:p>
-            <a:pPr marL="171450" indent="-171450">
+            <a:pPr marL="0" indent="0">
               <a:buFont typeface="Arial" panose="020B0604020202020204" pitchFamily="34" charset="0"/>
-              <a:buChar char="•"/>
+              <a:buNone/>
             </a:pPr>
-            <a:r>
-              <a:rPr lang="en-US" dirty="0"/>
-              <a:t>As aforementioned, we have two problems. The first is inefficient use of memory space. That is because traditional DRAM allocators bring about high memory fragmentation.</a:t>
-            </a:r>
-          </a:p>
-          <a:p>
-            <a:pPr marL="171450" indent="-171450">
-              <a:buFont typeface="Arial" panose="020B0604020202020204" pitchFamily="34" charset="0"/>
-              <a:buChar char="•"/>
-            </a:pPr>
-            <a:r>
-              <a:rPr lang="en-US" dirty="0"/>
-              <a:t>Here is an illustration of how a traditional DRAM allocator works. Typically, the allocator divides the main memory space into fixed-length large chunks. Each chunk serves memory allocations of a specific size. The sizes of allocation are predefined, static.</a:t>
-            </a:r>
-          </a:p>
-          <a:p>
-            <a:pPr marL="171450" indent="-171450">
-              <a:buFont typeface="Arial" panose="020B0604020202020204" pitchFamily="34" charset="0"/>
-              <a:buChar char="•"/>
-            </a:pPr>
-            <a:r>
-              <a:rPr lang="en-US" dirty="0"/>
-              <a:t>So, there is internal fragmentation if the requested size is smaller than the best-fit slot, as show in the figure.</a:t>
-            </a:r>
-          </a:p>
-          <a:p>
-            <a:pPr marL="171450" indent="-171450">
-              <a:buFont typeface="Arial" panose="020B0604020202020204" pitchFamily="34" charset="0"/>
-              <a:buChar char="•"/>
-            </a:pPr>
-            <a:r>
-              <a:rPr lang="en-US" dirty="0"/>
-              <a:t>There is external fragmentation when the workload changes. For example, initially a workload requests most allocations below 32B. After a while, it begins to request larger allocations. Then, it is possible most chunks have been used for small allocations, so not enough chunks are left for the large allocations, even though many free small segments exist. This is external fragmentation.</a:t>
-            </a:r>
+            <a:endParaRPr lang="en-US" dirty="0"/>
           </a:p>
         </p:txBody>
       </p:sp>
@@ -3015,16 +2775,6 @@
               <a:t>It is OK to waste some space for a short while. But for NVM, data occupation is supposed to be permanent.</a:t>
             </a:r>
           </a:p>
-          <a:p>
-            <a:pPr marL="171450" indent="-171450">
-              <a:buFont typeface="Arial" panose="020B0604020202020204" pitchFamily="34" charset="0"/>
-              <a:buChar char="•"/>
-            </a:pPr>
-            <a:r>
-              <a:rPr lang="en-US" dirty="0"/>
-              <a:t>Therefore reducing fragmentation and waste is very critical. This is the first motivation.</a:t>
-            </a:r>
-          </a:p>
         </p:txBody>
       </p:sp>
       <p:sp>
@@ -3113,26 +2863,6 @@
             </a:pPr>
             <a:r>
               <a:rPr lang="en-US" dirty="0"/>
-              <a:t>The second motivation is inefficient support for crash consistency. The key reason is that a traditional crash consistency mechanism writes data twice to ensure crash consistency.</a:t>
-            </a:r>
-          </a:p>
-          <a:p>
-            <a:pPr marL="171450" indent="-171450">
-              <a:buFont typeface="Arial" panose="020B0604020202020204" pitchFamily="34" charset="0"/>
-              <a:buChar char="•"/>
-            </a:pPr>
-            <a:r>
-              <a:rPr lang="en-US" dirty="0"/>
-              <a:t>We take redo logging for example. Suppose variables A and B locate in NVM. We want to move 1 from B to A, and ensure that the sum of both variables remains the same. This can be expressed by this transaction.</a:t>
-            </a:r>
-          </a:p>
-          <a:p>
-            <a:pPr marL="171450" indent="-171450">
-              <a:buFont typeface="Arial" panose="020B0604020202020204" pitchFamily="34" charset="0"/>
-              <a:buChar char="•"/>
-            </a:pPr>
-            <a:r>
-              <a:rPr lang="en-US" dirty="0"/>
               <a:t>If the transaction is interrupted by a crash, it must either roll back to the beginning state, or roll forward to the end state. To maintain such crash consistency, we cannot directly update A and B in-place.</a:t>
             </a:r>
           </a:p>
@@ -3246,10 +2976,7 @@
           <a:bodyPr/>
           <a:lstStyle/>
           <a:p>
-            <a:r>
-              <a:rPr lang="en-US" dirty="0"/>
-              <a:t>To solve the two problems, we designed log-structured non-volatile main memory.</a:t>
-            </a:r>
+            <a:endParaRPr lang="en-US" dirty="0"/>
           </a:p>
         </p:txBody>
       </p:sp>
@@ -3436,7 +3163,7 @@
           <a:p>
             <a:fld id="{9C9726B4-DE14-4788-8504-6CA1F52143A7}" type="datetime1">
               <a:rPr lang="en-US" smtClean="0"/>
-              <a:t>7/16/2017</a:t>
+              <a:t>12/6/2017</a:t>
             </a:fld>
             <a:endParaRPr lang="en-US"/>
           </a:p>
@@ -3634,7 +3361,7 @@
           <a:p>
             <a:fld id="{BBB91CA5-ABF6-48D0-B1F2-31ECBD39A456}" type="datetime1">
               <a:rPr lang="en-US" smtClean="0"/>
-              <a:t>7/16/2017</a:t>
+              <a:t>12/6/2017</a:t>
             </a:fld>
             <a:endParaRPr lang="en-US"/>
           </a:p>
@@ -3842,7 +3569,7 @@
           <a:p>
             <a:fld id="{444A22AD-C23E-4537-BF19-C97EF84DE023}" type="datetime1">
               <a:rPr lang="en-US" smtClean="0"/>
-              <a:t>7/16/2017</a:t>
+              <a:t>12/6/2017</a:t>
             </a:fld>
             <a:endParaRPr lang="en-US"/>
           </a:p>
@@ -4228,7 +3955,7 @@
           <a:p>
             <a:fld id="{D3E679A5-A8C4-42AD-949B-C2D1107A1D7C}" type="datetime1">
               <a:rPr lang="en-US" smtClean="0"/>
-              <a:t>7/16/2017</a:t>
+              <a:t>12/6/2017</a:t>
             </a:fld>
             <a:endParaRPr lang="en-US"/>
           </a:p>
@@ -4503,7 +4230,7 @@
           <a:p>
             <a:fld id="{3AAB5371-5AEA-4563-B33C-487A2F4F5A5E}" type="datetime1">
               <a:rPr lang="en-US" smtClean="0"/>
-              <a:t>7/16/2017</a:t>
+              <a:t>12/6/2017</a:t>
             </a:fld>
             <a:endParaRPr lang="en-US"/>
           </a:p>
@@ -4768,7 +4495,7 @@
           <a:p>
             <a:fld id="{66646330-2D0C-4061-83A1-7265CF8D9A2B}" type="datetime1">
               <a:rPr lang="en-US" smtClean="0"/>
-              <a:t>7/16/2017</a:t>
+              <a:t>12/6/2017</a:t>
             </a:fld>
             <a:endParaRPr lang="en-US"/>
           </a:p>
@@ -5180,7 +4907,7 @@
           <a:p>
             <a:fld id="{3837E3A0-09B5-453A-A0F8-4B4D7DAABB70}" type="datetime1">
               <a:rPr lang="en-US" smtClean="0"/>
-              <a:t>7/16/2017</a:t>
+              <a:t>12/6/2017</a:t>
             </a:fld>
             <a:endParaRPr lang="en-US"/>
           </a:p>
@@ -5321,7 +5048,7 @@
           <a:p>
             <a:fld id="{2AC8500D-EB2D-42F5-887F-3EB3DF4BB29E}" type="datetime1">
               <a:rPr lang="en-US" smtClean="0"/>
-              <a:t>7/16/2017</a:t>
+              <a:t>12/6/2017</a:t>
             </a:fld>
             <a:endParaRPr lang="en-US"/>
           </a:p>
@@ -5434,7 +5161,7 @@
           <a:p>
             <a:fld id="{8A62D4CB-FDCF-421F-9D70-47BD2089B47C}" type="datetime1">
               <a:rPr lang="en-US" smtClean="0"/>
-              <a:t>7/16/2017</a:t>
+              <a:t>12/6/2017</a:t>
             </a:fld>
             <a:endParaRPr lang="en-US"/>
           </a:p>
@@ -5745,7 +5472,7 @@
           <a:p>
             <a:fld id="{18166D43-85AE-4F5A-B097-2D2FA0111045}" type="datetime1">
               <a:rPr lang="en-US" smtClean="0"/>
-              <a:t>7/16/2017</a:t>
+              <a:t>12/6/2017</a:t>
             </a:fld>
             <a:endParaRPr lang="en-US"/>
           </a:p>
@@ -6033,7 +5760,7 @@
           <a:p>
             <a:fld id="{3C92645E-D5CF-4E69-951A-C0CBF0F19EA1}" type="datetime1">
               <a:rPr lang="en-US" smtClean="0"/>
-              <a:t>7/16/2017</a:t>
+              <a:t>12/6/2017</a:t>
             </a:fld>
             <a:endParaRPr lang="en-US"/>
           </a:p>
@@ -6274,7 +6001,7 @@
           <a:p>
             <a:fld id="{91138D1E-E4E6-4385-8F8D-D3A1C75805A8}" type="datetime1">
               <a:rPr lang="en-US" smtClean="0"/>
-              <a:t>7/16/2017</a:t>
+              <a:t>12/6/2017</a:t>
             </a:fld>
             <a:endParaRPr lang="en-US"/>
           </a:p>

</xml_diff>